<commit_message>
Updated powerpoint Presentation.pptx and the codes
</commit_message>
<xml_diff>
--- a/Presentation.pptx
+++ b/Presentation.pptx
@@ -7,6 +7,7 @@
   <p:sldIdLst>
     <p:sldId id="256" r:id="rId2"/>
     <p:sldId id="257" r:id="rId3"/>
+    <p:sldId id="258" r:id="rId4"/>
   </p:sldIdLst>
   <p:sldSz cx="12192000" cy="6858000"/>
   <p:notesSz cx="6858000" cy="9144000"/>
@@ -105,6 +106,11 @@
       </a:defRPr>
     </a:lvl9pPr>
   </p:defaultTextStyle>
+  <p:extLst>
+    <p:ext uri="{EFAFB233-063F-42B5-8137-9DF3F51BA10A}">
+      <p15:sldGuideLst xmlns:p15="http://schemas.microsoft.com/office/powerpoint/2012/main"/>
+    </p:ext>
+  </p:extLst>
 </p:presentation>
 </file>
 
@@ -1320,7 +1326,7 @@
             <a:fld id="{9334D819-9F07-4261-B09B-9E467E5D9002}" type="datetimeFigureOut">
               <a:rPr lang="en-US" dirty="0"/>
               <a:pPr/>
-              <a:t>3/18/2017</a:t>
+              <a:t>4/2/2017</a:t>
             </a:fld>
             <a:endParaRPr lang="en-US" dirty="0"/>
           </a:p>
@@ -1554,7 +1560,7 @@
           <a:p>
             <a:fld id="{9334D819-9F07-4261-B09B-9E467E5D9002}" type="datetimeFigureOut">
               <a:rPr lang="en-US" dirty="0"/>
-              <a:t>3/18/2017</a:t>
+              <a:t>4/2/2017</a:t>
             </a:fld>
             <a:endParaRPr lang="en-US" dirty="0"/>
           </a:p>
@@ -1729,7 +1735,7 @@
           <a:p>
             <a:fld id="{9334D819-9F07-4261-B09B-9E467E5D9002}" type="datetimeFigureOut">
               <a:rPr lang="en-US" dirty="0"/>
-              <a:t>3/18/2017</a:t>
+              <a:t>4/2/2017</a:t>
             </a:fld>
             <a:endParaRPr lang="en-US" dirty="0"/>
           </a:p>
@@ -1894,7 +1900,7 @@
           <a:p>
             <a:fld id="{9334D819-9F07-4261-B09B-9E467E5D9002}" type="datetimeFigureOut">
               <a:rPr lang="en-US" dirty="0"/>
-              <a:t>3/18/2017</a:t>
+              <a:t>4/2/2017</a:t>
             </a:fld>
             <a:endParaRPr lang="en-US" dirty="0"/>
           </a:p>
@@ -2166,7 +2172,7 @@
             <a:fld id="{9334D819-9F07-4261-B09B-9E467E5D9002}" type="datetimeFigureOut">
               <a:rPr lang="en-US" dirty="0"/>
               <a:pPr/>
-              <a:t>3/18/2017</a:t>
+              <a:t>4/2/2017</a:t>
             </a:fld>
             <a:endParaRPr lang="en-US" dirty="0"/>
           </a:p>
@@ -3363,7 +3369,7 @@
           <a:p>
             <a:fld id="{9334D819-9F07-4261-B09B-9E467E5D9002}" type="datetimeFigureOut">
               <a:rPr lang="en-US" dirty="0"/>
-              <a:t>3/18/2017</a:t>
+              <a:t>4/2/2017</a:t>
             </a:fld>
             <a:endParaRPr lang="en-US" dirty="0"/>
           </a:p>
@@ -3748,7 +3754,7 @@
           <a:p>
             <a:fld id="{9334D819-9F07-4261-B09B-9E467E5D9002}" type="datetimeFigureOut">
               <a:rPr lang="en-US" dirty="0"/>
-              <a:t>3/18/2017</a:t>
+              <a:t>4/2/2017</a:t>
             </a:fld>
             <a:endParaRPr lang="en-US" dirty="0"/>
           </a:p>
@@ -3866,7 +3872,7 @@
           <a:p>
             <a:fld id="{9334D819-9F07-4261-B09B-9E467E5D9002}" type="datetimeFigureOut">
               <a:rPr lang="en-US" dirty="0"/>
-              <a:t>3/18/2017</a:t>
+              <a:t>4/2/2017</a:t>
             </a:fld>
             <a:endParaRPr lang="en-US" dirty="0"/>
           </a:p>
@@ -3956,7 +3962,7 @@
           <a:p>
             <a:fld id="{9334D819-9F07-4261-B09B-9E467E5D9002}" type="datetimeFigureOut">
               <a:rPr lang="en-US" dirty="0"/>
-              <a:t>3/18/2017</a:t>
+              <a:t>4/2/2017</a:t>
             </a:fld>
             <a:endParaRPr lang="en-US" dirty="0"/>
           </a:p>
@@ -4714,7 +4720,7 @@
           <a:p>
             <a:fld id="{9334D819-9F07-4261-B09B-9E467E5D9002}" type="datetimeFigureOut">
               <a:rPr lang="en-US" dirty="0"/>
-              <a:t>3/18/2017</a:t>
+              <a:t>4/2/2017</a:t>
             </a:fld>
             <a:endParaRPr lang="en-US" dirty="0"/>
           </a:p>
@@ -5549,7 +5555,7 @@
           <a:p>
             <a:fld id="{9334D819-9F07-4261-B09B-9E467E5D9002}" type="datetimeFigureOut">
               <a:rPr lang="en-US" dirty="0"/>
-              <a:t>3/18/2017</a:t>
+              <a:t>4/2/2017</a:t>
             </a:fld>
             <a:endParaRPr lang="en-US" dirty="0"/>
           </a:p>
@@ -5772,7 +5778,7 @@
             <a:fld id="{9334D819-9F07-4261-B09B-9E467E5D9002}" type="datetimeFigureOut">
               <a:rPr lang="en-US" dirty="0"/>
               <a:pPr/>
-              <a:t>3/18/2017</a:t>
+              <a:t>4/2/2017</a:t>
             </a:fld>
             <a:endParaRPr lang="en-US" dirty="0"/>
           </a:p>
@@ -6767,54 +6773,79 @@
           <a:chExt cx="0" cy="0"/>
         </a:xfrm>
       </p:grpSpPr>
-      <p:pic>
-        <p:nvPicPr>
-          <p:cNvPr id="9" name="Picture 8"/>
-          <p:cNvPicPr>
-            <a:picLocks noChangeAspect="1"/>
-          </p:cNvPicPr>
+      <p:sp>
+        <p:nvSpPr>
+          <p:cNvPr id="2" name="TextBox 1"/>
+          <p:cNvSpPr txBox="1"/>
           <p:nvPr/>
-        </p:nvPicPr>
-        <p:blipFill>
-          <a:blip r:embed="rId2"/>
-          <a:stretch>
-            <a:fillRect/>
-          </a:stretch>
-        </p:blipFill>
+        </p:nvSpPr>
         <p:spPr>
           <a:xfrm>
-            <a:off x="4563354" y="1525173"/>
-            <a:ext cx="3487322" cy="3487322"/>
+            <a:off x="4346713" y="1298713"/>
+            <a:ext cx="3657600" cy="3785652"/>
           </a:xfrm>
           <a:prstGeom prst="rect">
             <a:avLst/>
           </a:prstGeom>
+          <a:noFill/>
         </p:spPr>
-      </p:pic>
-      <p:pic>
-        <p:nvPicPr>
-          <p:cNvPr id="13" name="Picture 12"/>
-          <p:cNvPicPr>
-            <a:picLocks noChangeAspect="1"/>
-          </p:cNvPicPr>
+        <p:txBody>
+          <a:bodyPr wrap="square" rtlCol="0">
+            <a:spAutoFit/>
+          </a:bodyPr>
+          <a:lstStyle/>
+          <a:p>
+            <a:pPr algn="ctr"/>
+            <a:r>
+              <a:rPr lang="en-PH" sz="6000" dirty="0">
+                <a:latin typeface="Bookman Old Style" panose="02050604050505020204" pitchFamily="18" charset="0"/>
+              </a:rPr>
+              <a:t>RFID Counter and Reader</a:t>
+            </a:r>
+          </a:p>
+        </p:txBody>
+      </p:sp>
+      <p:sp>
+        <p:nvSpPr>
+          <p:cNvPr id="3" name="TextBox 2"/>
+          <p:cNvSpPr txBox="1"/>
           <p:nvPr/>
-        </p:nvPicPr>
-        <p:blipFill>
-          <a:blip r:embed="rId3"/>
-          <a:stretch>
-            <a:fillRect/>
-          </a:stretch>
-        </p:blipFill>
+        </p:nvSpPr>
         <p:spPr>
           <a:xfrm>
-            <a:off x="2878015" y="4651423"/>
-            <a:ext cx="6858000" cy="3238500"/>
+            <a:off x="477078" y="5300870"/>
+            <a:ext cx="8269357" cy="1384995"/>
           </a:xfrm>
           <a:prstGeom prst="rect">
             <a:avLst/>
           </a:prstGeom>
+          <a:noFill/>
         </p:spPr>
-      </p:pic>
+        <p:txBody>
+          <a:bodyPr wrap="square" rtlCol="0">
+            <a:spAutoFit/>
+          </a:bodyPr>
+          <a:lstStyle/>
+          <a:p>
+            <a:r>
+              <a:rPr lang="en-PH" sz="2800" dirty="0"/>
+              <a:t>Jana Marie Gardon</a:t>
+            </a:r>
+          </a:p>
+          <a:p>
+            <a:r>
+              <a:rPr lang="en-PH" sz="2800" dirty="0"/>
+              <a:t>Johanna Marisse Heramia</a:t>
+            </a:r>
+          </a:p>
+          <a:p>
+            <a:r>
+              <a:rPr lang="en-PH" sz="2800" dirty="0"/>
+              <a:t>Jose Lorenzo Tadeo</a:t>
+            </a:r>
+          </a:p>
+        </p:txBody>
+      </p:sp>
     </p:spTree>
     <p:extLst>
       <p:ext uri="{BB962C8B-B14F-4D97-AF65-F5344CB8AC3E}">
@@ -6860,7 +6891,10 @@
           <a:bodyPr/>
           <a:lstStyle/>
           <a:p>
-            <a:endParaRPr lang="en-PH"/>
+            <a:r>
+              <a:rPr lang="en-PH" dirty="0"/>
+              <a:t>Materials:</a:t>
+            </a:r>
           </a:p>
         </p:txBody>
       </p:sp>
@@ -6876,10 +6910,27 @@
         </p:nvSpPr>
         <p:spPr/>
         <p:txBody>
-          <a:bodyPr/>
+          <a:bodyPr>
+            <a:normAutofit/>
+          </a:bodyPr>
           <a:lstStyle/>
           <a:p>
-            <a:endParaRPr lang="en-PH"/>
+            <a:r>
+              <a:rPr lang="en-PH" sz="3200" dirty="0"/>
+              <a:t>Arduino 328 Board</a:t>
+            </a:r>
+          </a:p>
+          <a:p>
+            <a:r>
+              <a:rPr lang="en-PH" sz="3200" dirty="0"/>
+              <a:t>PN532 RFID/NFC Shield</a:t>
+            </a:r>
+          </a:p>
+          <a:p>
+            <a:r>
+              <a:rPr lang="en-PH" sz="3200" dirty="0"/>
+              <a:t>RFID Card</a:t>
+            </a:r>
           </a:p>
         </p:txBody>
       </p:sp>
@@ -6887,6 +6938,74 @@
     <p:extLst>
       <p:ext uri="{BB962C8B-B14F-4D97-AF65-F5344CB8AC3E}">
         <p14:creationId xmlns:p14="http://schemas.microsoft.com/office/powerpoint/2010/main" val="737375059"/>
+      </p:ext>
+    </p:extLst>
+  </p:cSld>
+  <p:clrMapOvr>
+    <a:masterClrMapping/>
+  </p:clrMapOvr>
+</p:sld>
+</file>
+
+<file path=ppt/slides/slide3.xml><?xml version="1.0" encoding="utf-8"?>
+<p:sld xmlns:a="http://schemas.openxmlformats.org/drawingml/2006/main" xmlns:r="http://schemas.openxmlformats.org/officeDocument/2006/relationships" xmlns:p="http://schemas.openxmlformats.org/presentationml/2006/main">
+  <p:cSld>
+    <p:spTree>
+      <p:nvGrpSpPr>
+        <p:cNvPr id="1" name=""/>
+        <p:cNvGrpSpPr/>
+        <p:nvPr/>
+      </p:nvGrpSpPr>
+      <p:grpSpPr>
+        <a:xfrm>
+          <a:off x="0" y="0"/>
+          <a:ext cx="0" cy="0"/>
+          <a:chOff x="0" y="0"/>
+          <a:chExt cx="0" cy="0"/>
+        </a:xfrm>
+      </p:grpSpPr>
+      <p:sp>
+        <p:nvSpPr>
+          <p:cNvPr id="2" name="Title 1"/>
+          <p:cNvSpPr>
+            <a:spLocks noGrp="1"/>
+          </p:cNvSpPr>
+          <p:nvPr>
+            <p:ph type="title"/>
+          </p:nvPr>
+        </p:nvSpPr>
+        <p:spPr/>
+        <p:txBody>
+          <a:bodyPr/>
+          <a:lstStyle/>
+          <a:p>
+            <a:endParaRPr lang="en-PH"/>
+          </a:p>
+        </p:txBody>
+      </p:sp>
+      <p:sp>
+        <p:nvSpPr>
+          <p:cNvPr id="3" name="Content Placeholder 2"/>
+          <p:cNvSpPr>
+            <a:spLocks noGrp="1"/>
+          </p:cNvSpPr>
+          <p:nvPr>
+            <p:ph idx="1"/>
+          </p:nvPr>
+        </p:nvSpPr>
+        <p:spPr/>
+        <p:txBody>
+          <a:bodyPr/>
+          <a:lstStyle/>
+          <a:p>
+            <a:endParaRPr lang="en-PH"/>
+          </a:p>
+        </p:txBody>
+      </p:sp>
+    </p:spTree>
+    <p:extLst>
+      <p:ext uri="{BB962C8B-B14F-4D97-AF65-F5344CB8AC3E}">
+        <p14:creationId xmlns:p14="http://schemas.microsoft.com/office/powerpoint/2010/main" val="1058707157"/>
       </p:ext>
     </p:extLst>
   </p:cSld>

</xml_diff>